<commit_message>
Update do Powerpoint (~50%)
</commit_message>
<xml_diff>
--- a/Documentacao/Especificacao_Sistema_Informacao/AndroidPowerPoint.pptx
+++ b/Documentacao/Especificacao_Sistema_Informacao/AndroidPowerPoint.pptx
@@ -5,7 +5,7 @@
     <p:sldMasterId id="2147483648" r:id="rId1"/>
   </p:sldMasterIdLst>
   <p:notesMasterIdLst>
-    <p:notesMasterId r:id="rId9"/>
+    <p:notesMasterId r:id="rId13"/>
   </p:notesMasterIdLst>
   <p:sldIdLst>
     <p:sldId id="256" r:id="rId2"/>
@@ -15,6 +15,10 @@
     <p:sldId id="260" r:id="rId6"/>
     <p:sldId id="261" r:id="rId7"/>
     <p:sldId id="262" r:id="rId8"/>
+    <p:sldId id="263" r:id="rId9"/>
+    <p:sldId id="264" r:id="rId10"/>
+    <p:sldId id="265" r:id="rId11"/>
+    <p:sldId id="266" r:id="rId12"/>
   </p:sldIdLst>
   <p:sldSz cx="12192000" cy="6858000"/>
   <p:notesSz cx="6858000" cy="9144000"/>
@@ -124,6 +128,18 @@
 </p:presentation>
 </file>
 
+<file path=ppt/commentAuthors.xml><?xml version="1.0" encoding="utf-8"?>
+<p:cmAuthorLst xmlns:a="http://schemas.openxmlformats.org/drawingml/2006/main" xmlns:r="http://schemas.openxmlformats.org/officeDocument/2006/relationships" xmlns:p="http://schemas.openxmlformats.org/presentationml/2006/main">
+  <p:cmAuthor id="1" name="André Filipe Andrade Machado" initials="AFAM" lastIdx="1" clrIdx="0">
+    <p:extLst>
+      <p:ext uri="{19B8F6BF-5375-455C-9EA6-DF929625EA0E}">
+        <p15:presenceInfo xmlns:p15="http://schemas.microsoft.com/office/powerpoint/2012/main" userId="S::2180622@my.ipleiria.pt::97ccd917-5980-497a-be8b-f510e2c7b449" providerId="AD"/>
+      </p:ext>
+    </p:extLst>
+  </p:cmAuthor>
+</p:cmAuthorLst>
+</file>
+
 <file path=ppt/notesMasters/notesMaster1.xml><?xml version="1.0" encoding="utf-8"?>
 <p:notesMaster xmlns:a="http://schemas.openxmlformats.org/drawingml/2006/main" xmlns:r="http://schemas.openxmlformats.org/officeDocument/2006/relationships" xmlns:p="http://schemas.openxmlformats.org/presentationml/2006/main">
   <p:cSld>
@@ -206,7 +222,7 @@
           <a:p>
             <a:fld id="{3828EB0C-59E7-4923-9919-3543B15E7FC4}" type="datetimeFigureOut">
               <a:rPr lang="pt-PT" smtClean="0"/>
-              <a:t>05/11/2020</a:t>
+              <a:t>06/11/2020</a:t>
             </a:fld>
             <a:endParaRPr lang="pt-PT"/>
           </a:p>
@@ -704,7 +720,7 @@
           <a:p>
             <a:fld id="{CE5FAA5E-A8A4-4EB3-868D-803B30303312}" type="datetimeFigureOut">
               <a:rPr lang="pt-PT" smtClean="0"/>
-              <a:t>05/11/2020</a:t>
+              <a:t>06/11/2020</a:t>
             </a:fld>
             <a:endParaRPr lang="pt-PT"/>
           </a:p>
@@ -902,7 +918,7 @@
           <a:p>
             <a:fld id="{CE5FAA5E-A8A4-4EB3-868D-803B30303312}" type="datetimeFigureOut">
               <a:rPr lang="pt-PT" smtClean="0"/>
-              <a:t>05/11/2020</a:t>
+              <a:t>06/11/2020</a:t>
             </a:fld>
             <a:endParaRPr lang="pt-PT"/>
           </a:p>
@@ -1110,7 +1126,7 @@
           <a:p>
             <a:fld id="{CE5FAA5E-A8A4-4EB3-868D-803B30303312}" type="datetimeFigureOut">
               <a:rPr lang="pt-PT" smtClean="0"/>
-              <a:t>05/11/2020</a:t>
+              <a:t>06/11/2020</a:t>
             </a:fld>
             <a:endParaRPr lang="pt-PT"/>
           </a:p>
@@ -1308,7 +1324,7 @@
           <a:p>
             <a:fld id="{CE5FAA5E-A8A4-4EB3-868D-803B30303312}" type="datetimeFigureOut">
               <a:rPr lang="pt-PT" smtClean="0"/>
-              <a:t>05/11/2020</a:t>
+              <a:t>06/11/2020</a:t>
             </a:fld>
             <a:endParaRPr lang="pt-PT"/>
           </a:p>
@@ -1583,7 +1599,7 @@
           <a:p>
             <a:fld id="{CE5FAA5E-A8A4-4EB3-868D-803B30303312}" type="datetimeFigureOut">
               <a:rPr lang="pt-PT" smtClean="0"/>
-              <a:t>05/11/2020</a:t>
+              <a:t>06/11/2020</a:t>
             </a:fld>
             <a:endParaRPr lang="pt-PT"/>
           </a:p>
@@ -1848,7 +1864,7 @@
           <a:p>
             <a:fld id="{CE5FAA5E-A8A4-4EB3-868D-803B30303312}" type="datetimeFigureOut">
               <a:rPr lang="pt-PT" smtClean="0"/>
-              <a:t>05/11/2020</a:t>
+              <a:t>06/11/2020</a:t>
             </a:fld>
             <a:endParaRPr lang="pt-PT"/>
           </a:p>
@@ -2260,7 +2276,7 @@
           <a:p>
             <a:fld id="{CE5FAA5E-A8A4-4EB3-868D-803B30303312}" type="datetimeFigureOut">
               <a:rPr lang="pt-PT" smtClean="0"/>
-              <a:t>05/11/2020</a:t>
+              <a:t>06/11/2020</a:t>
             </a:fld>
             <a:endParaRPr lang="pt-PT"/>
           </a:p>
@@ -2401,7 +2417,7 @@
           <a:p>
             <a:fld id="{CE5FAA5E-A8A4-4EB3-868D-803B30303312}" type="datetimeFigureOut">
               <a:rPr lang="pt-PT" smtClean="0"/>
-              <a:t>05/11/2020</a:t>
+              <a:t>06/11/2020</a:t>
             </a:fld>
             <a:endParaRPr lang="pt-PT"/>
           </a:p>
@@ -2514,7 +2530,7 @@
           <a:p>
             <a:fld id="{CE5FAA5E-A8A4-4EB3-868D-803B30303312}" type="datetimeFigureOut">
               <a:rPr lang="pt-PT" smtClean="0"/>
-              <a:t>05/11/2020</a:t>
+              <a:t>06/11/2020</a:t>
             </a:fld>
             <a:endParaRPr lang="pt-PT"/>
           </a:p>
@@ -2825,7 +2841,7 @@
           <a:p>
             <a:fld id="{CE5FAA5E-A8A4-4EB3-868D-803B30303312}" type="datetimeFigureOut">
               <a:rPr lang="pt-PT" smtClean="0"/>
-              <a:t>05/11/2020</a:t>
+              <a:t>06/11/2020</a:t>
             </a:fld>
             <a:endParaRPr lang="pt-PT"/>
           </a:p>
@@ -3113,7 +3129,7 @@
           <a:p>
             <a:fld id="{CE5FAA5E-A8A4-4EB3-868D-803B30303312}" type="datetimeFigureOut">
               <a:rPr lang="pt-PT" smtClean="0"/>
-              <a:t>05/11/2020</a:t>
+              <a:t>06/11/2020</a:t>
             </a:fld>
             <a:endParaRPr lang="pt-PT"/>
           </a:p>
@@ -3354,7 +3370,7 @@
           <a:p>
             <a:fld id="{CE5FAA5E-A8A4-4EB3-868D-803B30303312}" type="datetimeFigureOut">
               <a:rPr lang="pt-PT" smtClean="0"/>
-              <a:t>05/11/2020</a:t>
+              <a:t>06/11/2020</a:t>
             </a:fld>
             <a:endParaRPr lang="pt-PT"/>
           </a:p>
@@ -3991,6 +4007,606 @@
 </p:sld>
 </file>
 
+<file path=ppt/slides/slide10.xml><?xml version="1.0" encoding="utf-8"?>
+<p:sld xmlns:a="http://schemas.openxmlformats.org/drawingml/2006/main" xmlns:r="http://schemas.openxmlformats.org/officeDocument/2006/relationships" xmlns:p="http://schemas.openxmlformats.org/presentationml/2006/main">
+  <p:cSld>
+    <p:spTree>
+      <p:nvGrpSpPr>
+        <p:cNvPr id="1" name=""/>
+        <p:cNvGrpSpPr/>
+        <p:nvPr/>
+      </p:nvGrpSpPr>
+      <p:grpSpPr>
+        <a:xfrm>
+          <a:off x="0" y="0"/>
+          <a:ext cx="0" cy="0"/>
+          <a:chOff x="0" y="0"/>
+          <a:chExt cx="0" cy="0"/>
+        </a:xfrm>
+      </p:grpSpPr>
+      <p:pic>
+        <p:nvPicPr>
+          <p:cNvPr id="6" name="Marcador de Posição de Conteúdo 5">
+            <a:extLst>
+              <a:ext uri="{FF2B5EF4-FFF2-40B4-BE49-F238E27FC236}">
+                <a16:creationId xmlns:a16="http://schemas.microsoft.com/office/drawing/2014/main" id="{1D72A45E-C7C2-4743-B09B-EF3DA2E6954E}"/>
+              </a:ext>
+            </a:extLst>
+          </p:cNvPr>
+          <p:cNvPicPr>
+            <a:picLocks noGrp="1" noChangeAspect="1"/>
+          </p:cNvPicPr>
+          <p:nvPr>
+            <p:ph idx="1"/>
+          </p:nvPr>
+        </p:nvPicPr>
+        <p:blipFill>
+          <a:blip r:embed="rId2"/>
+          <a:stretch>
+            <a:fillRect/>
+          </a:stretch>
+        </p:blipFill>
+        <p:spPr>
+          <a:xfrm>
+            <a:off x="838200" y="1828800"/>
+            <a:ext cx="2446511" cy="4351338"/>
+          </a:xfrm>
+          <a:prstGeom prst="rect">
+            <a:avLst/>
+          </a:prstGeom>
+          <a:ln w="6350">
+            <a:solidFill>
+              <a:schemeClr val="tx1"/>
+            </a:solidFill>
+          </a:ln>
+        </p:spPr>
+      </p:pic>
+      <p:sp>
+        <p:nvSpPr>
+          <p:cNvPr id="5" name="Título 1">
+            <a:extLst>
+              <a:ext uri="{FF2B5EF4-FFF2-40B4-BE49-F238E27FC236}">
+                <a16:creationId xmlns:a16="http://schemas.microsoft.com/office/drawing/2014/main" id="{2983375B-0D0E-4192-A2AB-9A61BB8F68BB}"/>
+              </a:ext>
+            </a:extLst>
+          </p:cNvPr>
+          <p:cNvSpPr txBox="1">
+            <a:spLocks/>
+          </p:cNvSpPr>
+          <p:nvPr/>
+        </p:nvSpPr>
+        <p:spPr>
+          <a:xfrm>
+            <a:off x="838200" y="0"/>
+            <a:ext cx="10515600" cy="1325563"/>
+          </a:xfrm>
+          <a:prstGeom prst="rect">
+            <a:avLst/>
+          </a:prstGeom>
+        </p:spPr>
+        <p:txBody>
+          <a:bodyPr vert="horz" lIns="91440" tIns="45720" rIns="91440" bIns="45720" rtlCol="0" anchor="ctr">
+            <a:normAutofit/>
+          </a:bodyPr>
+          <a:lstStyle>
+            <a:lvl1pPr algn="l" defTabSz="914400" rtl="0" eaLnBrk="1" latinLnBrk="0" hangingPunct="1">
+              <a:lnSpc>
+                <a:spcPct val="90000"/>
+              </a:lnSpc>
+              <a:spcBef>
+                <a:spcPct val="0"/>
+              </a:spcBef>
+              <a:buNone/>
+              <a:defRPr sz="4400" kern="1200">
+                <a:solidFill>
+                  <a:schemeClr val="tx1"/>
+                </a:solidFill>
+                <a:latin typeface="+mj-lt"/>
+                <a:ea typeface="+mj-ea"/>
+                <a:cs typeface="+mj-cs"/>
+              </a:defRPr>
+            </a:lvl1pPr>
+          </a:lstStyle>
+          <a:p>
+            <a:pPr algn="ctr"/>
+            <a:r>
+              <a:rPr lang="pt-PT" b="1" dirty="0"/>
+              <a:t>Mockups</a:t>
+            </a:r>
+          </a:p>
+        </p:txBody>
+      </p:sp>
+      <p:pic>
+        <p:nvPicPr>
+          <p:cNvPr id="7" name="Imagem 6">
+            <a:extLst>
+              <a:ext uri="{FF2B5EF4-FFF2-40B4-BE49-F238E27FC236}">
+                <a16:creationId xmlns:a16="http://schemas.microsoft.com/office/drawing/2014/main" id="{4A1C43B8-D709-4695-A37E-D36694AFE33F}"/>
+              </a:ext>
+            </a:extLst>
+          </p:cNvPr>
+          <p:cNvPicPr>
+            <a:picLocks noChangeAspect="1"/>
+          </p:cNvPicPr>
+          <p:nvPr/>
+        </p:nvPicPr>
+        <p:blipFill>
+          <a:blip r:embed="rId3"/>
+          <a:stretch>
+            <a:fillRect/>
+          </a:stretch>
+        </p:blipFill>
+        <p:spPr>
+          <a:xfrm>
+            <a:off x="4872744" y="1828800"/>
+            <a:ext cx="2446512" cy="4351338"/>
+          </a:xfrm>
+          <a:prstGeom prst="rect">
+            <a:avLst/>
+          </a:prstGeom>
+          <a:ln w="6350">
+            <a:solidFill>
+              <a:schemeClr val="tx1"/>
+            </a:solidFill>
+          </a:ln>
+        </p:spPr>
+      </p:pic>
+      <p:pic>
+        <p:nvPicPr>
+          <p:cNvPr id="8" name="Imagem 7">
+            <a:extLst>
+              <a:ext uri="{FF2B5EF4-FFF2-40B4-BE49-F238E27FC236}">
+                <a16:creationId xmlns:a16="http://schemas.microsoft.com/office/drawing/2014/main" id="{94FEC74E-2C57-4697-AEDC-AD46BBD90080}"/>
+              </a:ext>
+            </a:extLst>
+          </p:cNvPr>
+          <p:cNvPicPr>
+            <a:picLocks noChangeAspect="1"/>
+          </p:cNvPicPr>
+          <p:nvPr/>
+        </p:nvPicPr>
+        <p:blipFill>
+          <a:blip r:embed="rId4"/>
+          <a:stretch>
+            <a:fillRect/>
+          </a:stretch>
+        </p:blipFill>
+        <p:spPr>
+          <a:xfrm>
+            <a:off x="8907289" y="1833677"/>
+            <a:ext cx="2443770" cy="4346461"/>
+          </a:xfrm>
+          <a:prstGeom prst="rect">
+            <a:avLst/>
+          </a:prstGeom>
+          <a:ln w="6350">
+            <a:solidFill>
+              <a:schemeClr val="tx1"/>
+            </a:solidFill>
+          </a:ln>
+        </p:spPr>
+      </p:pic>
+      <p:sp>
+        <p:nvSpPr>
+          <p:cNvPr id="11" name="CaixaDeTexto 10">
+            <a:extLst>
+              <a:ext uri="{FF2B5EF4-FFF2-40B4-BE49-F238E27FC236}">
+                <a16:creationId xmlns:a16="http://schemas.microsoft.com/office/drawing/2014/main" id="{93903D7A-7D3B-4AF1-9236-D69E8CBC41D1}"/>
+              </a:ext>
+            </a:extLst>
+          </p:cNvPr>
+          <p:cNvSpPr txBox="1"/>
+          <p:nvPr/>
+        </p:nvSpPr>
+        <p:spPr>
+          <a:xfrm>
+            <a:off x="838197" y="1459468"/>
+            <a:ext cx="2446513" cy="369332"/>
+          </a:xfrm>
+          <a:prstGeom prst="rect">
+            <a:avLst/>
+          </a:prstGeom>
+          <a:noFill/>
+        </p:spPr>
+        <p:txBody>
+          <a:bodyPr wrap="square" rtlCol="0">
+            <a:spAutoFit/>
+          </a:bodyPr>
+          <a:lstStyle/>
+          <a:p>
+            <a:pPr algn="ctr"/>
+            <a:r>
+              <a:rPr lang="pt-PT" dirty="0"/>
+              <a:t>Ficha de Obra Periódica</a:t>
+            </a:r>
+          </a:p>
+        </p:txBody>
+      </p:sp>
+      <p:sp>
+        <p:nvSpPr>
+          <p:cNvPr id="13" name="CaixaDeTexto 12">
+            <a:extLst>
+              <a:ext uri="{FF2B5EF4-FFF2-40B4-BE49-F238E27FC236}">
+                <a16:creationId xmlns:a16="http://schemas.microsoft.com/office/drawing/2014/main" id="{C328E239-B7F9-44B8-BD5B-314BC3A423BA}"/>
+              </a:ext>
+            </a:extLst>
+          </p:cNvPr>
+          <p:cNvSpPr txBox="1"/>
+          <p:nvPr/>
+        </p:nvSpPr>
+        <p:spPr>
+          <a:xfrm>
+            <a:off x="4870000" y="1459468"/>
+            <a:ext cx="2446513" cy="369332"/>
+          </a:xfrm>
+          <a:prstGeom prst="rect">
+            <a:avLst/>
+          </a:prstGeom>
+          <a:noFill/>
+        </p:spPr>
+        <p:txBody>
+          <a:bodyPr wrap="square" rtlCol="0">
+            <a:spAutoFit/>
+          </a:bodyPr>
+          <a:lstStyle/>
+          <a:p>
+            <a:pPr algn="ctr"/>
+            <a:r>
+              <a:rPr lang="pt-PT" dirty="0"/>
+              <a:t>Ficha de Obra Periódica</a:t>
+            </a:r>
+          </a:p>
+        </p:txBody>
+      </p:sp>
+      <p:sp>
+        <p:nvSpPr>
+          <p:cNvPr id="15" name="CaixaDeTexto 14">
+            <a:extLst>
+              <a:ext uri="{FF2B5EF4-FFF2-40B4-BE49-F238E27FC236}">
+                <a16:creationId xmlns:a16="http://schemas.microsoft.com/office/drawing/2014/main" id="{8616DE49-4BFE-4148-ABBA-85818D53C927}"/>
+              </a:ext>
+            </a:extLst>
+          </p:cNvPr>
+          <p:cNvSpPr txBox="1"/>
+          <p:nvPr/>
+        </p:nvSpPr>
+        <p:spPr>
+          <a:xfrm>
+            <a:off x="8904546" y="1459468"/>
+            <a:ext cx="2446513" cy="369332"/>
+          </a:xfrm>
+          <a:prstGeom prst="rect">
+            <a:avLst/>
+          </a:prstGeom>
+          <a:noFill/>
+        </p:spPr>
+        <p:txBody>
+          <a:bodyPr wrap="square" rtlCol="0">
+            <a:spAutoFit/>
+          </a:bodyPr>
+          <a:lstStyle/>
+          <a:p>
+            <a:pPr algn="ctr"/>
+            <a:r>
+              <a:rPr lang="pt-PT" dirty="0"/>
+              <a:t>Ficha de Obra Periódica</a:t>
+            </a:r>
+          </a:p>
+        </p:txBody>
+      </p:sp>
+    </p:spTree>
+    <p:extLst>
+      <p:ext uri="{BB962C8B-B14F-4D97-AF65-F5344CB8AC3E}">
+        <p14:creationId xmlns:p14="http://schemas.microsoft.com/office/powerpoint/2010/main" val="4021584946"/>
+      </p:ext>
+    </p:extLst>
+  </p:cSld>
+  <p:clrMapOvr>
+    <a:masterClrMapping/>
+  </p:clrMapOvr>
+</p:sld>
+</file>
+
+<file path=ppt/slides/slide11.xml><?xml version="1.0" encoding="utf-8"?>
+<p:sld xmlns:a="http://schemas.openxmlformats.org/drawingml/2006/main" xmlns:r="http://schemas.openxmlformats.org/officeDocument/2006/relationships" xmlns:p="http://schemas.openxmlformats.org/presentationml/2006/main">
+  <p:cSld>
+    <p:spTree>
+      <p:nvGrpSpPr>
+        <p:cNvPr id="1" name=""/>
+        <p:cNvGrpSpPr/>
+        <p:nvPr/>
+      </p:nvGrpSpPr>
+      <p:grpSpPr>
+        <a:xfrm>
+          <a:off x="0" y="0"/>
+          <a:ext cx="0" cy="0"/>
+          <a:chOff x="0" y="0"/>
+          <a:chExt cx="0" cy="0"/>
+        </a:xfrm>
+      </p:grpSpPr>
+      <p:pic>
+        <p:nvPicPr>
+          <p:cNvPr id="6" name="Marcador de Posição de Conteúdo 5">
+            <a:extLst>
+              <a:ext uri="{FF2B5EF4-FFF2-40B4-BE49-F238E27FC236}">
+                <a16:creationId xmlns:a16="http://schemas.microsoft.com/office/drawing/2014/main" id="{E3D57B0C-D271-4CBA-BB3E-21B71EC21EF0}"/>
+              </a:ext>
+            </a:extLst>
+          </p:cNvPr>
+          <p:cNvPicPr>
+            <a:picLocks noGrp="1" noChangeAspect="1"/>
+          </p:cNvPicPr>
+          <p:nvPr>
+            <p:ph idx="1"/>
+          </p:nvPr>
+        </p:nvPicPr>
+        <p:blipFill>
+          <a:blip r:embed="rId2"/>
+          <a:stretch>
+            <a:fillRect/>
+          </a:stretch>
+        </p:blipFill>
+        <p:spPr>
+          <a:xfrm>
+            <a:off x="838200" y="1828801"/>
+            <a:ext cx="2446511" cy="4351338"/>
+          </a:xfrm>
+          <a:prstGeom prst="rect">
+            <a:avLst/>
+          </a:prstGeom>
+          <a:ln w="6350">
+            <a:solidFill>
+              <a:schemeClr val="tx1"/>
+            </a:solidFill>
+          </a:ln>
+        </p:spPr>
+      </p:pic>
+      <p:sp>
+        <p:nvSpPr>
+          <p:cNvPr id="5" name="Título 1">
+            <a:extLst>
+              <a:ext uri="{FF2B5EF4-FFF2-40B4-BE49-F238E27FC236}">
+                <a16:creationId xmlns:a16="http://schemas.microsoft.com/office/drawing/2014/main" id="{73FCBF88-B3F6-47D9-A341-EA0788CA0CCE}"/>
+              </a:ext>
+            </a:extLst>
+          </p:cNvPr>
+          <p:cNvSpPr txBox="1">
+            <a:spLocks/>
+          </p:cNvSpPr>
+          <p:nvPr/>
+        </p:nvSpPr>
+        <p:spPr>
+          <a:xfrm>
+            <a:off x="838200" y="0"/>
+            <a:ext cx="10515600" cy="1325563"/>
+          </a:xfrm>
+          <a:prstGeom prst="rect">
+            <a:avLst/>
+          </a:prstGeom>
+        </p:spPr>
+        <p:txBody>
+          <a:bodyPr vert="horz" lIns="91440" tIns="45720" rIns="91440" bIns="45720" rtlCol="0" anchor="ctr">
+            <a:normAutofit/>
+          </a:bodyPr>
+          <a:lstStyle>
+            <a:lvl1pPr algn="l" defTabSz="914400" rtl="0" eaLnBrk="1" latinLnBrk="0" hangingPunct="1">
+              <a:lnSpc>
+                <a:spcPct val="90000"/>
+              </a:lnSpc>
+              <a:spcBef>
+                <a:spcPct val="0"/>
+              </a:spcBef>
+              <a:buNone/>
+              <a:defRPr sz="4400" kern="1200">
+                <a:solidFill>
+                  <a:schemeClr val="tx1"/>
+                </a:solidFill>
+                <a:latin typeface="+mj-lt"/>
+                <a:ea typeface="+mj-ea"/>
+                <a:cs typeface="+mj-cs"/>
+              </a:defRPr>
+            </a:lvl1pPr>
+          </a:lstStyle>
+          <a:p>
+            <a:pPr algn="ctr"/>
+            <a:r>
+              <a:rPr lang="pt-PT" b="1" dirty="0"/>
+              <a:t>Mockups</a:t>
+            </a:r>
+          </a:p>
+        </p:txBody>
+      </p:sp>
+      <p:pic>
+        <p:nvPicPr>
+          <p:cNvPr id="7" name="Imagem 6">
+            <a:extLst>
+              <a:ext uri="{FF2B5EF4-FFF2-40B4-BE49-F238E27FC236}">
+                <a16:creationId xmlns:a16="http://schemas.microsoft.com/office/drawing/2014/main" id="{049F955E-0F2D-44CF-97C7-BA8DC616D6BA}"/>
+              </a:ext>
+            </a:extLst>
+          </p:cNvPr>
+          <p:cNvPicPr>
+            <a:picLocks noChangeAspect="1"/>
+          </p:cNvPicPr>
+          <p:nvPr/>
+        </p:nvPicPr>
+        <p:blipFill>
+          <a:blip r:embed="rId3"/>
+          <a:stretch>
+            <a:fillRect/>
+          </a:stretch>
+        </p:blipFill>
+        <p:spPr>
+          <a:xfrm>
+            <a:off x="4872744" y="1828801"/>
+            <a:ext cx="2446511" cy="4351337"/>
+          </a:xfrm>
+          <a:prstGeom prst="rect">
+            <a:avLst/>
+          </a:prstGeom>
+          <a:ln w="6350">
+            <a:solidFill>
+              <a:schemeClr val="tx1"/>
+            </a:solidFill>
+          </a:ln>
+        </p:spPr>
+      </p:pic>
+      <p:pic>
+        <p:nvPicPr>
+          <p:cNvPr id="8" name="Imagem 7">
+            <a:extLst>
+              <a:ext uri="{FF2B5EF4-FFF2-40B4-BE49-F238E27FC236}">
+                <a16:creationId xmlns:a16="http://schemas.microsoft.com/office/drawing/2014/main" id="{40ED9829-3E2A-43E4-87BF-410A10999F65}"/>
+              </a:ext>
+            </a:extLst>
+          </p:cNvPr>
+          <p:cNvPicPr>
+            <a:picLocks noChangeAspect="1"/>
+          </p:cNvPicPr>
+          <p:nvPr/>
+        </p:nvPicPr>
+        <p:blipFill>
+          <a:blip r:embed="rId4"/>
+          <a:stretch>
+            <a:fillRect/>
+          </a:stretch>
+        </p:blipFill>
+        <p:spPr>
+          <a:xfrm>
+            <a:off x="8907288" y="1828801"/>
+            <a:ext cx="2446512" cy="4351338"/>
+          </a:xfrm>
+          <a:prstGeom prst="rect">
+            <a:avLst/>
+          </a:prstGeom>
+          <a:ln w="6350">
+            <a:solidFill>
+              <a:schemeClr val="tx1"/>
+            </a:solidFill>
+          </a:ln>
+        </p:spPr>
+      </p:pic>
+      <p:sp>
+        <p:nvSpPr>
+          <p:cNvPr id="9" name="CaixaDeTexto 8">
+            <a:extLst>
+              <a:ext uri="{FF2B5EF4-FFF2-40B4-BE49-F238E27FC236}">
+                <a16:creationId xmlns:a16="http://schemas.microsoft.com/office/drawing/2014/main" id="{378670A6-4134-47CE-9BCC-1CA0D534AA63}"/>
+              </a:ext>
+            </a:extLst>
+          </p:cNvPr>
+          <p:cNvSpPr txBox="1"/>
+          <p:nvPr/>
+        </p:nvSpPr>
+        <p:spPr>
+          <a:xfrm>
+            <a:off x="136643" y="1459469"/>
+            <a:ext cx="3849624" cy="369332"/>
+          </a:xfrm>
+          <a:prstGeom prst="rect">
+            <a:avLst/>
+          </a:prstGeom>
+          <a:noFill/>
+        </p:spPr>
+        <p:txBody>
+          <a:bodyPr wrap="square" rtlCol="0">
+            <a:spAutoFit/>
+          </a:bodyPr>
+          <a:lstStyle/>
+          <a:p>
+            <a:pPr algn="ctr"/>
+            <a:r>
+              <a:rPr lang="pt-PT" dirty="0"/>
+              <a:t>Lista de Exemplares por Arrumar Vazia</a:t>
+            </a:r>
+          </a:p>
+        </p:txBody>
+      </p:sp>
+      <p:sp>
+        <p:nvSpPr>
+          <p:cNvPr id="11" name="CaixaDeTexto 10">
+            <a:extLst>
+              <a:ext uri="{FF2B5EF4-FFF2-40B4-BE49-F238E27FC236}">
+                <a16:creationId xmlns:a16="http://schemas.microsoft.com/office/drawing/2014/main" id="{FDB5DC41-336D-44A4-8357-5FAC4D122EA8}"/>
+              </a:ext>
+            </a:extLst>
+          </p:cNvPr>
+          <p:cNvSpPr txBox="1"/>
+          <p:nvPr/>
+        </p:nvSpPr>
+        <p:spPr>
+          <a:xfrm>
+            <a:off x="4459734" y="1459469"/>
+            <a:ext cx="3272531" cy="369332"/>
+          </a:xfrm>
+          <a:prstGeom prst="rect">
+            <a:avLst/>
+          </a:prstGeom>
+          <a:noFill/>
+        </p:spPr>
+        <p:txBody>
+          <a:bodyPr wrap="square" rtlCol="0">
+            <a:spAutoFit/>
+          </a:bodyPr>
+          <a:lstStyle/>
+          <a:p>
+            <a:pPr algn="ctr"/>
+            <a:r>
+              <a:rPr lang="pt-PT" dirty="0"/>
+              <a:t>Lista de Exemplares por Arrumar</a:t>
+            </a:r>
+          </a:p>
+        </p:txBody>
+      </p:sp>
+      <p:sp>
+        <p:nvSpPr>
+          <p:cNvPr id="13" name="CaixaDeTexto 12">
+            <a:extLst>
+              <a:ext uri="{FF2B5EF4-FFF2-40B4-BE49-F238E27FC236}">
+                <a16:creationId xmlns:a16="http://schemas.microsoft.com/office/drawing/2014/main" id="{C2481220-9193-423C-9244-2CDA43E0289A}"/>
+              </a:ext>
+            </a:extLst>
+          </p:cNvPr>
+          <p:cNvSpPr txBox="1"/>
+          <p:nvPr/>
+        </p:nvSpPr>
+        <p:spPr>
+          <a:xfrm>
+            <a:off x="8653536" y="1459469"/>
+            <a:ext cx="2954016" cy="369332"/>
+          </a:xfrm>
+          <a:prstGeom prst="rect">
+            <a:avLst/>
+          </a:prstGeom>
+          <a:noFill/>
+        </p:spPr>
+        <p:txBody>
+          <a:bodyPr wrap="square" rtlCol="0">
+            <a:spAutoFit/>
+          </a:bodyPr>
+          <a:lstStyle/>
+          <a:p>
+            <a:pPr algn="ctr"/>
+            <a:r>
+              <a:rPr lang="pt-PT" dirty="0"/>
+              <a:t>Confirmar Livro Arrumado</a:t>
+            </a:r>
+          </a:p>
+        </p:txBody>
+      </p:sp>
+    </p:spTree>
+    <p:extLst>
+      <p:ext uri="{BB962C8B-B14F-4D97-AF65-F5344CB8AC3E}">
+        <p14:creationId xmlns:p14="http://schemas.microsoft.com/office/powerpoint/2010/main" val="1094354394"/>
+      </p:ext>
+    </p:extLst>
+  </p:cSld>
+  <p:clrMapOvr>
+    <a:masterClrMapping/>
+  </p:clrMapOvr>
+</p:sld>
+</file>
+
 <file path=ppt/slides/slide2.xml><?xml version="1.0" encoding="utf-8"?>
 <p:sld xmlns:a="http://schemas.openxmlformats.org/drawingml/2006/main" xmlns:r="http://schemas.openxmlformats.org/officeDocument/2006/relationships" xmlns:p="http://schemas.openxmlformats.org/presentationml/2006/main">
   <p:cSld>
@@ -4243,7 +4859,11 @@
           <a:bodyPr/>
           <a:lstStyle/>
           <a:p>
-            <a:endParaRPr lang="pt-PT"/>
+            <a:pPr algn="ctr"/>
+            <a:r>
+              <a:rPr lang="pt-PT" b="1" dirty="0"/>
+              <a:t>Distribuição de Tarefas</a:t>
+            </a:r>
           </a:p>
         </p:txBody>
       </p:sp>
@@ -4447,7 +5067,12 @@
             <p:ph type="title"/>
           </p:nvPr>
         </p:nvSpPr>
-        <p:spPr/>
+        <p:spPr>
+          <a:xfrm>
+            <a:off x="838197" y="0"/>
+            <a:ext cx="10515600" cy="1325563"/>
+          </a:xfrm>
+        </p:spPr>
         <p:txBody>
           <a:bodyPr/>
           <a:lstStyle/>
@@ -4484,13 +5109,13 @@
         </p:blipFill>
         <p:spPr>
           <a:xfrm>
-            <a:off x="838197" y="1783968"/>
+            <a:off x="838197" y="1828800"/>
             <a:ext cx="2446511" cy="4351338"/>
           </a:xfrm>
           <a:prstGeom prst="rect">
             <a:avLst/>
           </a:prstGeom>
-          <a:ln w="3175">
+          <a:ln w="6350">
             <a:solidFill>
               <a:schemeClr val="tx1">
                 <a:alpha val="99000"/>
@@ -4516,7 +5141,7 @@
         </p:nvSpPr>
         <p:spPr>
           <a:xfrm>
-            <a:off x="755904" y="1414636"/>
+            <a:off x="747763" y="1459468"/>
             <a:ext cx="2627376" cy="369332"/>
           </a:xfrm>
           <a:prstGeom prst="rect">
@@ -4551,7 +5176,7 @@
         </p:nvSpPr>
         <p:spPr>
           <a:xfrm>
-            <a:off x="4872743" y="1420550"/>
+            <a:off x="4872741" y="1459468"/>
             <a:ext cx="2446511" cy="369332"/>
           </a:xfrm>
           <a:prstGeom prst="rect">
@@ -4595,25 +5220,70 @@
         </p:blipFill>
         <p:spPr>
           <a:xfrm>
-            <a:off x="4872743" y="1783968"/>
+            <a:off x="4872743" y="1828800"/>
             <a:ext cx="2446512" cy="4351338"/>
           </a:xfrm>
           <a:prstGeom prst="rect">
             <a:avLst/>
           </a:prstGeom>
-          <a:ln w="3175">
+          <a:ln w="6350">
             <a:solidFill>
               <a:schemeClr val="tx1"/>
             </a:solidFill>
           </a:ln>
         </p:spPr>
       </p:pic>
+      <p:sp>
+        <p:nvSpPr>
+          <p:cNvPr id="9" name="CaixaDeTexto 8">
+            <a:extLst>
+              <a:ext uri="{FF2B5EF4-FFF2-40B4-BE49-F238E27FC236}">
+                <a16:creationId xmlns:a16="http://schemas.microsoft.com/office/drawing/2014/main" id="{6AE764A9-7105-4A27-9C44-6089033FEEC6}"/>
+              </a:ext>
+            </a:extLst>
+          </p:cNvPr>
+          <p:cNvSpPr txBox="1"/>
+          <p:nvPr/>
+        </p:nvSpPr>
+        <p:spPr>
+          <a:xfrm>
+            <a:off x="8907286" y="1459468"/>
+            <a:ext cx="2446511" cy="369332"/>
+          </a:xfrm>
+          <a:prstGeom prst="rect">
+            <a:avLst/>
+          </a:prstGeom>
+          <a:noFill/>
+        </p:spPr>
+        <p:txBody>
+          <a:bodyPr wrap="square" rtlCol="0">
+            <a:spAutoFit/>
+          </a:bodyPr>
+          <a:lstStyle/>
+          <a:p>
+            <a:pPr algn="ctr"/>
+            <a:r>
+              <a:rPr lang="pt-PT" dirty="0" err="1"/>
+              <a:t>Navigation</a:t>
+            </a:r>
+            <a:r>
+              <a:rPr lang="pt-PT" dirty="0"/>
+              <a:t> </a:t>
+            </a:r>
+            <a:r>
+              <a:rPr lang="pt-PT" dirty="0" err="1"/>
+              <a:t>Drawer</a:t>
+            </a:r>
+            <a:endParaRPr lang="pt-PT" dirty="0"/>
+          </a:p>
+        </p:txBody>
+      </p:sp>
       <p:pic>
         <p:nvPicPr>
-          <p:cNvPr id="8" name="Imagem 7">
-            <a:extLst>
-              <a:ext uri="{FF2B5EF4-FFF2-40B4-BE49-F238E27FC236}">
-                <a16:creationId xmlns:a16="http://schemas.microsoft.com/office/drawing/2014/main" id="{4E0D5D86-50B0-4DEE-AAE0-C4024F4F82F9}"/>
+          <p:cNvPr id="3" name="Imagem 2">
+            <a:extLst>
+              <a:ext uri="{FF2B5EF4-FFF2-40B4-BE49-F238E27FC236}">
+                <a16:creationId xmlns:a16="http://schemas.microsoft.com/office/drawing/2014/main" id="{36583987-44DD-4B22-A821-99384CB7309E}"/>
               </a:ext>
             </a:extLst>
           </p:cNvPr>
@@ -4630,59 +5300,19 @@
         </p:blipFill>
         <p:spPr>
           <a:xfrm>
-            <a:off x="8907288" y="1783968"/>
-            <a:ext cx="2446512" cy="4351338"/>
+            <a:off x="8907288" y="1828800"/>
+            <a:ext cx="2446512" cy="4351339"/>
           </a:xfrm>
           <a:prstGeom prst="rect">
             <a:avLst/>
           </a:prstGeom>
+          <a:ln w="6350">
+            <a:solidFill>
+              <a:schemeClr val="tx1"/>
+            </a:solidFill>
+          </a:ln>
         </p:spPr>
       </p:pic>
-      <p:sp>
-        <p:nvSpPr>
-          <p:cNvPr id="9" name="CaixaDeTexto 8">
-            <a:extLst>
-              <a:ext uri="{FF2B5EF4-FFF2-40B4-BE49-F238E27FC236}">
-                <a16:creationId xmlns:a16="http://schemas.microsoft.com/office/drawing/2014/main" id="{6AE764A9-7105-4A27-9C44-6089033FEEC6}"/>
-              </a:ext>
-            </a:extLst>
-          </p:cNvPr>
-          <p:cNvSpPr txBox="1"/>
-          <p:nvPr/>
-        </p:nvSpPr>
-        <p:spPr>
-          <a:xfrm>
-            <a:off x="8907289" y="1414636"/>
-            <a:ext cx="2446511" cy="369332"/>
-          </a:xfrm>
-          <a:prstGeom prst="rect">
-            <a:avLst/>
-          </a:prstGeom>
-          <a:noFill/>
-        </p:spPr>
-        <p:txBody>
-          <a:bodyPr wrap="square" rtlCol="0">
-            <a:spAutoFit/>
-          </a:bodyPr>
-          <a:lstStyle/>
-          <a:p>
-            <a:pPr algn="ctr"/>
-            <a:r>
-              <a:rPr lang="pt-PT" dirty="0" err="1"/>
-              <a:t>Activity</a:t>
-            </a:r>
-            <a:r>
-              <a:rPr lang="pt-PT" dirty="0"/>
-              <a:t> </a:t>
-            </a:r>
-            <a:r>
-              <a:rPr lang="pt-PT" dirty="0" err="1"/>
-              <a:t>Drawer</a:t>
-            </a:r>
-            <a:endParaRPr lang="pt-PT" dirty="0"/>
-          </a:p>
-        </p:txBody>
-      </p:sp>
     </p:spTree>
     <p:extLst>
       <p:ext uri="{BB962C8B-B14F-4D97-AF65-F5344CB8AC3E}">
@@ -4715,51 +5345,291 @@
       </p:grpSpPr>
       <p:sp>
         <p:nvSpPr>
-          <p:cNvPr id="2" name="Título 1">
-            <a:extLst>
-              <a:ext uri="{FF2B5EF4-FFF2-40B4-BE49-F238E27FC236}">
-                <a16:creationId xmlns:a16="http://schemas.microsoft.com/office/drawing/2014/main" id="{681FA820-787E-4358-83D0-02EADCE5DA7A}"/>
-              </a:ext>
-            </a:extLst>
-          </p:cNvPr>
-          <p:cNvSpPr>
-            <a:spLocks noGrp="1"/>
-          </p:cNvSpPr>
-          <p:nvPr>
-            <p:ph type="title"/>
-          </p:nvPr>
-        </p:nvSpPr>
-        <p:spPr/>
-        <p:txBody>
-          <a:bodyPr/>
-          <a:lstStyle/>
-          <a:p>
-            <a:endParaRPr lang="pt-PT"/>
-          </a:p>
-        </p:txBody>
-      </p:sp>
-      <p:sp>
-        <p:nvSpPr>
-          <p:cNvPr id="3" name="Marcador de Posição de Conteúdo 2">
-            <a:extLst>
-              <a:ext uri="{FF2B5EF4-FFF2-40B4-BE49-F238E27FC236}">
-                <a16:creationId xmlns:a16="http://schemas.microsoft.com/office/drawing/2014/main" id="{7D0DE8A4-53C3-4A1A-8C9A-C695D3B233EB}"/>
-              </a:ext>
-            </a:extLst>
-          </p:cNvPr>
-          <p:cNvSpPr>
-            <a:spLocks noGrp="1"/>
-          </p:cNvSpPr>
+          <p:cNvPr id="4" name="Título 1">
+            <a:extLst>
+              <a:ext uri="{FF2B5EF4-FFF2-40B4-BE49-F238E27FC236}">
+                <a16:creationId xmlns:a16="http://schemas.microsoft.com/office/drawing/2014/main" id="{C3D31F85-6A10-4C6A-B9EB-FBF400F6DDB6}"/>
+              </a:ext>
+            </a:extLst>
+          </p:cNvPr>
+          <p:cNvSpPr txBox="1">
+            <a:spLocks/>
+          </p:cNvSpPr>
+          <p:nvPr/>
+        </p:nvSpPr>
+        <p:spPr>
+          <a:xfrm>
+            <a:off x="838200" y="0"/>
+            <a:ext cx="10515600" cy="1325563"/>
+          </a:xfrm>
+          <a:prstGeom prst="rect">
+            <a:avLst/>
+          </a:prstGeom>
+        </p:spPr>
+        <p:txBody>
+          <a:bodyPr vert="horz" lIns="91440" tIns="45720" rIns="91440" bIns="45720" rtlCol="0" anchor="ctr">
+            <a:normAutofit/>
+          </a:bodyPr>
+          <a:lstStyle>
+            <a:lvl1pPr algn="l" defTabSz="914400" rtl="0" eaLnBrk="1" latinLnBrk="0" hangingPunct="1">
+              <a:lnSpc>
+                <a:spcPct val="90000"/>
+              </a:lnSpc>
+              <a:spcBef>
+                <a:spcPct val="0"/>
+              </a:spcBef>
+              <a:buNone/>
+              <a:defRPr sz="4400" kern="1200">
+                <a:solidFill>
+                  <a:schemeClr val="tx1"/>
+                </a:solidFill>
+                <a:latin typeface="+mj-lt"/>
+                <a:ea typeface="+mj-ea"/>
+                <a:cs typeface="+mj-cs"/>
+              </a:defRPr>
+            </a:lvl1pPr>
+          </a:lstStyle>
+          <a:p>
+            <a:pPr algn="ctr"/>
+            <a:r>
+              <a:rPr lang="pt-PT" b="1" dirty="0"/>
+              <a:t>Mockups</a:t>
+            </a:r>
+          </a:p>
+        </p:txBody>
+      </p:sp>
+      <p:pic>
+        <p:nvPicPr>
+          <p:cNvPr id="6" name="Marcador de Posição de Conteúdo 5">
+            <a:extLst>
+              <a:ext uri="{FF2B5EF4-FFF2-40B4-BE49-F238E27FC236}">
+                <a16:creationId xmlns:a16="http://schemas.microsoft.com/office/drawing/2014/main" id="{27A33BC0-CE67-4D2F-A8DD-09AA87F6AA4B}"/>
+              </a:ext>
+            </a:extLst>
+          </p:cNvPr>
+          <p:cNvPicPr>
+            <a:picLocks noGrp="1" noChangeAspect="1"/>
+          </p:cNvPicPr>
           <p:nvPr>
             <p:ph idx="1"/>
           </p:nvPr>
-        </p:nvSpPr>
-        <p:spPr/>
-        <p:txBody>
-          <a:bodyPr/>
-          <a:lstStyle/>
-          <a:p>
-            <a:endParaRPr lang="pt-PT"/>
+        </p:nvPicPr>
+        <p:blipFill>
+          <a:blip r:embed="rId2"/>
+          <a:stretch>
+            <a:fillRect/>
+          </a:stretch>
+        </p:blipFill>
+        <p:spPr>
+          <a:xfrm>
+            <a:off x="838200" y="1828800"/>
+            <a:ext cx="2446511" cy="4351338"/>
+          </a:xfrm>
+          <a:prstGeom prst="rect">
+            <a:avLst/>
+          </a:prstGeom>
+          <a:ln w="6350">
+            <a:solidFill>
+              <a:schemeClr val="tx1"/>
+            </a:solidFill>
+          </a:ln>
+        </p:spPr>
+      </p:pic>
+      <p:pic>
+        <p:nvPicPr>
+          <p:cNvPr id="7" name="Imagem 6">
+            <a:extLst>
+              <a:ext uri="{FF2B5EF4-FFF2-40B4-BE49-F238E27FC236}">
+                <a16:creationId xmlns:a16="http://schemas.microsoft.com/office/drawing/2014/main" id="{ACCD2B2E-CB26-4A8F-A34E-FF195B59E2FE}"/>
+              </a:ext>
+            </a:extLst>
+          </p:cNvPr>
+          <p:cNvPicPr>
+            <a:picLocks noChangeAspect="1"/>
+          </p:cNvPicPr>
+          <p:nvPr/>
+        </p:nvPicPr>
+        <p:blipFill>
+          <a:blip r:embed="rId3"/>
+          <a:stretch>
+            <a:fillRect/>
+          </a:stretch>
+        </p:blipFill>
+        <p:spPr>
+          <a:xfrm>
+            <a:off x="4872744" y="1828800"/>
+            <a:ext cx="2446512" cy="4351338"/>
+          </a:xfrm>
+          <a:prstGeom prst="rect">
+            <a:avLst/>
+          </a:prstGeom>
+          <a:ln w="6350">
+            <a:solidFill>
+              <a:schemeClr val="tx1"/>
+            </a:solidFill>
+          </a:ln>
+        </p:spPr>
+      </p:pic>
+      <p:pic>
+        <p:nvPicPr>
+          <p:cNvPr id="8" name="Imagem 7">
+            <a:extLst>
+              <a:ext uri="{FF2B5EF4-FFF2-40B4-BE49-F238E27FC236}">
+                <a16:creationId xmlns:a16="http://schemas.microsoft.com/office/drawing/2014/main" id="{6C1267A3-863E-4922-B5B0-6A72080FBD69}"/>
+              </a:ext>
+            </a:extLst>
+          </p:cNvPr>
+          <p:cNvPicPr>
+            <a:picLocks noChangeAspect="1"/>
+          </p:cNvPicPr>
+          <p:nvPr/>
+        </p:nvPicPr>
+        <p:blipFill>
+          <a:blip r:embed="rId4"/>
+          <a:stretch>
+            <a:fillRect/>
+          </a:stretch>
+        </p:blipFill>
+        <p:spPr>
+          <a:xfrm>
+            <a:off x="8907289" y="1828800"/>
+            <a:ext cx="2446512" cy="4351338"/>
+          </a:xfrm>
+          <a:prstGeom prst="rect">
+            <a:avLst/>
+          </a:prstGeom>
+          <a:ln w="6350">
+            <a:solidFill>
+              <a:schemeClr val="tx1"/>
+            </a:solidFill>
+          </a:ln>
+        </p:spPr>
+      </p:pic>
+      <p:sp>
+        <p:nvSpPr>
+          <p:cNvPr id="9" name="CaixaDeTexto 8">
+            <a:extLst>
+              <a:ext uri="{FF2B5EF4-FFF2-40B4-BE49-F238E27FC236}">
+                <a16:creationId xmlns:a16="http://schemas.microsoft.com/office/drawing/2014/main" id="{0A6100E2-F4F8-48F8-80C7-16F76842C86C}"/>
+              </a:ext>
+            </a:extLst>
+          </p:cNvPr>
+          <p:cNvSpPr txBox="1"/>
+          <p:nvPr/>
+        </p:nvSpPr>
+        <p:spPr>
+          <a:xfrm>
+            <a:off x="666995" y="1182469"/>
+            <a:ext cx="2788920" cy="646331"/>
+          </a:xfrm>
+          <a:prstGeom prst="rect">
+            <a:avLst/>
+          </a:prstGeom>
+          <a:noFill/>
+        </p:spPr>
+        <p:txBody>
+          <a:bodyPr wrap="square" rtlCol="0">
+            <a:spAutoFit/>
+          </a:bodyPr>
+          <a:lstStyle/>
+          <a:p>
+            <a:pPr algn="ctr"/>
+            <a:r>
+              <a:rPr lang="pt-PT" dirty="0"/>
+              <a:t>Dashboard sobreposto pelo</a:t>
+            </a:r>
+          </a:p>
+          <a:p>
+            <a:pPr algn="ctr"/>
+            <a:r>
+              <a:rPr lang="pt-PT" dirty="0"/>
+              <a:t> </a:t>
+            </a:r>
+            <a:r>
+              <a:rPr lang="pt-PT" dirty="0" err="1"/>
+              <a:t>Navigation</a:t>
+            </a:r>
+            <a:r>
+              <a:rPr lang="pt-PT" dirty="0"/>
+              <a:t> </a:t>
+            </a:r>
+            <a:r>
+              <a:rPr lang="pt-PT" dirty="0" err="1"/>
+              <a:t>Drawer</a:t>
+            </a:r>
+            <a:endParaRPr lang="pt-PT" dirty="0"/>
+          </a:p>
+        </p:txBody>
+      </p:sp>
+      <p:sp>
+        <p:nvSpPr>
+          <p:cNvPr id="10" name="CaixaDeTexto 9">
+            <a:extLst>
+              <a:ext uri="{FF2B5EF4-FFF2-40B4-BE49-F238E27FC236}">
+                <a16:creationId xmlns:a16="http://schemas.microsoft.com/office/drawing/2014/main" id="{4B832085-2490-494D-A946-1C21341851AE}"/>
+              </a:ext>
+            </a:extLst>
+          </p:cNvPr>
+          <p:cNvSpPr txBox="1"/>
+          <p:nvPr/>
+        </p:nvSpPr>
+        <p:spPr>
+          <a:xfrm>
+            <a:off x="4872744" y="1455896"/>
+            <a:ext cx="2446512" cy="369332"/>
+          </a:xfrm>
+          <a:prstGeom prst="rect">
+            <a:avLst/>
+          </a:prstGeom>
+          <a:noFill/>
+        </p:spPr>
+        <p:txBody>
+          <a:bodyPr wrap="square" rtlCol="0">
+            <a:spAutoFit/>
+          </a:bodyPr>
+          <a:lstStyle/>
+          <a:p>
+            <a:pPr algn="ctr"/>
+            <a:r>
+              <a:rPr lang="pt-PT" dirty="0"/>
+              <a:t>Listagem de Leitores</a:t>
+            </a:r>
+          </a:p>
+        </p:txBody>
+      </p:sp>
+      <p:sp>
+        <p:nvSpPr>
+          <p:cNvPr id="11" name="CaixaDeTexto 10">
+            <a:extLst>
+              <a:ext uri="{FF2B5EF4-FFF2-40B4-BE49-F238E27FC236}">
+                <a16:creationId xmlns:a16="http://schemas.microsoft.com/office/drawing/2014/main" id="{1154EAC5-F9CA-4F13-B98E-0C76920C9F08}"/>
+              </a:ext>
+            </a:extLst>
+          </p:cNvPr>
+          <p:cNvSpPr txBox="1"/>
+          <p:nvPr/>
+        </p:nvSpPr>
+        <p:spPr>
+          <a:xfrm>
+            <a:off x="8907289" y="1455896"/>
+            <a:ext cx="2446511" cy="369332"/>
+          </a:xfrm>
+          <a:prstGeom prst="rect">
+            <a:avLst/>
+          </a:prstGeom>
+          <a:noFill/>
+        </p:spPr>
+        <p:txBody>
+          <a:bodyPr wrap="square" rtlCol="0">
+            <a:spAutoFit/>
+          </a:bodyPr>
+          <a:lstStyle/>
+          <a:p>
+            <a:pPr algn="ctr"/>
+            <a:r>
+              <a:rPr lang="pt-PT" dirty="0"/>
+              <a:t>Ficha do Leitor</a:t>
+            </a:r>
           </a:p>
         </p:txBody>
       </p:sp>
@@ -4767,6 +5637,606 @@
     <p:extLst>
       <p:ext uri="{BB962C8B-B14F-4D97-AF65-F5344CB8AC3E}">
         <p14:creationId xmlns:p14="http://schemas.microsoft.com/office/powerpoint/2010/main" val="3318748849"/>
+      </p:ext>
+    </p:extLst>
+  </p:cSld>
+  <p:clrMapOvr>
+    <a:masterClrMapping/>
+  </p:clrMapOvr>
+</p:sld>
+</file>
+
+<file path=ppt/slides/slide8.xml><?xml version="1.0" encoding="utf-8"?>
+<p:sld xmlns:a="http://schemas.openxmlformats.org/drawingml/2006/main" xmlns:r="http://schemas.openxmlformats.org/officeDocument/2006/relationships" xmlns:p="http://schemas.openxmlformats.org/presentationml/2006/main">
+  <p:cSld>
+    <p:spTree>
+      <p:nvGrpSpPr>
+        <p:cNvPr id="1" name=""/>
+        <p:cNvGrpSpPr/>
+        <p:nvPr/>
+      </p:nvGrpSpPr>
+      <p:grpSpPr>
+        <a:xfrm>
+          <a:off x="0" y="0"/>
+          <a:ext cx="0" cy="0"/>
+          <a:chOff x="0" y="0"/>
+          <a:chExt cx="0" cy="0"/>
+        </a:xfrm>
+      </p:grpSpPr>
+      <p:pic>
+        <p:nvPicPr>
+          <p:cNvPr id="6" name="Marcador de Posição de Conteúdo 5">
+            <a:extLst>
+              <a:ext uri="{FF2B5EF4-FFF2-40B4-BE49-F238E27FC236}">
+                <a16:creationId xmlns:a16="http://schemas.microsoft.com/office/drawing/2014/main" id="{557655B1-CAEF-44A7-B9AD-675391B9B32A}"/>
+              </a:ext>
+            </a:extLst>
+          </p:cNvPr>
+          <p:cNvPicPr>
+            <a:picLocks noGrp="1" noChangeAspect="1"/>
+          </p:cNvPicPr>
+          <p:nvPr>
+            <p:ph idx="1"/>
+          </p:nvPr>
+        </p:nvPicPr>
+        <p:blipFill>
+          <a:blip r:embed="rId2"/>
+          <a:stretch>
+            <a:fillRect/>
+          </a:stretch>
+        </p:blipFill>
+        <p:spPr>
+          <a:xfrm>
+            <a:off x="838200" y="1828800"/>
+            <a:ext cx="2446511" cy="4351338"/>
+          </a:xfrm>
+          <a:prstGeom prst="rect">
+            <a:avLst/>
+          </a:prstGeom>
+          <a:ln w="6350">
+            <a:solidFill>
+              <a:schemeClr val="tx1"/>
+            </a:solidFill>
+          </a:ln>
+        </p:spPr>
+      </p:pic>
+      <p:sp>
+        <p:nvSpPr>
+          <p:cNvPr id="5" name="Título 1">
+            <a:extLst>
+              <a:ext uri="{FF2B5EF4-FFF2-40B4-BE49-F238E27FC236}">
+                <a16:creationId xmlns:a16="http://schemas.microsoft.com/office/drawing/2014/main" id="{5FF972A4-9F85-4E37-88EF-B2E3E2D28F7A}"/>
+              </a:ext>
+            </a:extLst>
+          </p:cNvPr>
+          <p:cNvSpPr txBox="1">
+            <a:spLocks/>
+          </p:cNvSpPr>
+          <p:nvPr/>
+        </p:nvSpPr>
+        <p:spPr>
+          <a:xfrm>
+            <a:off x="838200" y="0"/>
+            <a:ext cx="10515600" cy="1325563"/>
+          </a:xfrm>
+          <a:prstGeom prst="rect">
+            <a:avLst/>
+          </a:prstGeom>
+        </p:spPr>
+        <p:txBody>
+          <a:bodyPr vert="horz" lIns="91440" tIns="45720" rIns="91440" bIns="45720" rtlCol="0" anchor="ctr">
+            <a:normAutofit/>
+          </a:bodyPr>
+          <a:lstStyle>
+            <a:lvl1pPr algn="l" defTabSz="914400" rtl="0" eaLnBrk="1" latinLnBrk="0" hangingPunct="1">
+              <a:lnSpc>
+                <a:spcPct val="90000"/>
+              </a:lnSpc>
+              <a:spcBef>
+                <a:spcPct val="0"/>
+              </a:spcBef>
+              <a:buNone/>
+              <a:defRPr sz="4400" kern="1200">
+                <a:solidFill>
+                  <a:schemeClr val="tx1"/>
+                </a:solidFill>
+                <a:latin typeface="+mj-lt"/>
+                <a:ea typeface="+mj-ea"/>
+                <a:cs typeface="+mj-cs"/>
+              </a:defRPr>
+            </a:lvl1pPr>
+          </a:lstStyle>
+          <a:p>
+            <a:pPr algn="ctr"/>
+            <a:r>
+              <a:rPr lang="pt-PT" b="1" dirty="0"/>
+              <a:t>Mockups</a:t>
+            </a:r>
+          </a:p>
+        </p:txBody>
+      </p:sp>
+      <p:pic>
+        <p:nvPicPr>
+          <p:cNvPr id="7" name="Imagem 6">
+            <a:extLst>
+              <a:ext uri="{FF2B5EF4-FFF2-40B4-BE49-F238E27FC236}">
+                <a16:creationId xmlns:a16="http://schemas.microsoft.com/office/drawing/2014/main" id="{DD8FD671-9EA8-4D38-B213-8928FBC06833}"/>
+              </a:ext>
+            </a:extLst>
+          </p:cNvPr>
+          <p:cNvPicPr>
+            <a:picLocks noChangeAspect="1"/>
+          </p:cNvPicPr>
+          <p:nvPr/>
+        </p:nvPicPr>
+        <p:blipFill>
+          <a:blip r:embed="rId3"/>
+          <a:stretch>
+            <a:fillRect/>
+          </a:stretch>
+        </p:blipFill>
+        <p:spPr>
+          <a:xfrm>
+            <a:off x="4872743" y="1828800"/>
+            <a:ext cx="2446513" cy="4351341"/>
+          </a:xfrm>
+          <a:prstGeom prst="rect">
+            <a:avLst/>
+          </a:prstGeom>
+          <a:ln w="6350">
+            <a:solidFill>
+              <a:schemeClr val="tx1"/>
+            </a:solidFill>
+          </a:ln>
+        </p:spPr>
+      </p:pic>
+      <p:pic>
+        <p:nvPicPr>
+          <p:cNvPr id="8" name="Imagem 7">
+            <a:extLst>
+              <a:ext uri="{FF2B5EF4-FFF2-40B4-BE49-F238E27FC236}">
+                <a16:creationId xmlns:a16="http://schemas.microsoft.com/office/drawing/2014/main" id="{0E6CF046-4099-4E93-BF83-616D2CB32904}"/>
+              </a:ext>
+            </a:extLst>
+          </p:cNvPr>
+          <p:cNvPicPr>
+            <a:picLocks noChangeAspect="1"/>
+          </p:cNvPicPr>
+          <p:nvPr/>
+        </p:nvPicPr>
+        <p:blipFill>
+          <a:blip r:embed="rId4"/>
+          <a:stretch>
+            <a:fillRect/>
+          </a:stretch>
+        </p:blipFill>
+        <p:spPr>
+          <a:xfrm>
+            <a:off x="8907289" y="1828800"/>
+            <a:ext cx="2446512" cy="4351338"/>
+          </a:xfrm>
+          <a:prstGeom prst="rect">
+            <a:avLst/>
+          </a:prstGeom>
+          <a:ln w="6350">
+            <a:solidFill>
+              <a:schemeClr val="tx1"/>
+            </a:solidFill>
+          </a:ln>
+        </p:spPr>
+      </p:pic>
+      <p:sp>
+        <p:nvSpPr>
+          <p:cNvPr id="9" name="CaixaDeTexto 8">
+            <a:extLst>
+              <a:ext uri="{FF2B5EF4-FFF2-40B4-BE49-F238E27FC236}">
+                <a16:creationId xmlns:a16="http://schemas.microsoft.com/office/drawing/2014/main" id="{2CE1D329-CD3A-4D98-85F6-9559987F6AE7}"/>
+              </a:ext>
+            </a:extLst>
+          </p:cNvPr>
+          <p:cNvSpPr txBox="1"/>
+          <p:nvPr/>
+        </p:nvSpPr>
+        <p:spPr>
+          <a:xfrm>
+            <a:off x="4333737" y="1459468"/>
+            <a:ext cx="3524523" cy="369332"/>
+          </a:xfrm>
+          <a:prstGeom prst="rect">
+            <a:avLst/>
+          </a:prstGeom>
+          <a:noFill/>
+        </p:spPr>
+        <p:txBody>
+          <a:bodyPr wrap="square" rtlCol="0">
+            <a:spAutoFit/>
+          </a:bodyPr>
+          <a:lstStyle/>
+          <a:p>
+            <a:pPr algn="ctr"/>
+            <a:r>
+              <a:rPr lang="pt-PT" dirty="0"/>
+              <a:t>Reservas de Exemplares do Leitor</a:t>
+            </a:r>
+          </a:p>
+        </p:txBody>
+      </p:sp>
+      <p:sp>
+        <p:nvSpPr>
+          <p:cNvPr id="11" name="CaixaDeTexto 10">
+            <a:extLst>
+              <a:ext uri="{FF2B5EF4-FFF2-40B4-BE49-F238E27FC236}">
+                <a16:creationId xmlns:a16="http://schemas.microsoft.com/office/drawing/2014/main" id="{81513D81-6D04-44FF-9628-BEF147CB9A60}"/>
+              </a:ext>
+            </a:extLst>
+          </p:cNvPr>
+          <p:cNvSpPr txBox="1"/>
+          <p:nvPr/>
+        </p:nvSpPr>
+        <p:spPr>
+          <a:xfrm>
+            <a:off x="838195" y="1459468"/>
+            <a:ext cx="2446511" cy="369332"/>
+          </a:xfrm>
+          <a:prstGeom prst="rect">
+            <a:avLst/>
+          </a:prstGeom>
+          <a:noFill/>
+        </p:spPr>
+        <p:txBody>
+          <a:bodyPr wrap="square" rtlCol="0">
+            <a:spAutoFit/>
+          </a:bodyPr>
+          <a:lstStyle/>
+          <a:p>
+            <a:pPr algn="ctr"/>
+            <a:r>
+              <a:rPr lang="pt-PT" dirty="0"/>
+              <a:t>Empréstimos do Leitor</a:t>
+            </a:r>
+          </a:p>
+        </p:txBody>
+      </p:sp>
+      <p:sp>
+        <p:nvSpPr>
+          <p:cNvPr id="13" name="CaixaDeTexto 12">
+            <a:extLst>
+              <a:ext uri="{FF2B5EF4-FFF2-40B4-BE49-F238E27FC236}">
+                <a16:creationId xmlns:a16="http://schemas.microsoft.com/office/drawing/2014/main" id="{8D433E4B-5B56-4C79-85F5-81B909934C69}"/>
+              </a:ext>
+            </a:extLst>
+          </p:cNvPr>
+          <p:cNvSpPr txBox="1"/>
+          <p:nvPr/>
+        </p:nvSpPr>
+        <p:spPr>
+          <a:xfrm>
+            <a:off x="8121913" y="1459468"/>
+            <a:ext cx="4017263" cy="369332"/>
+          </a:xfrm>
+          <a:prstGeom prst="rect">
+            <a:avLst/>
+          </a:prstGeom>
+          <a:noFill/>
+        </p:spPr>
+        <p:txBody>
+          <a:bodyPr wrap="square" rtlCol="0">
+            <a:spAutoFit/>
+          </a:bodyPr>
+          <a:lstStyle/>
+          <a:p>
+            <a:pPr algn="ctr"/>
+            <a:r>
+              <a:rPr lang="pt-PT" dirty="0"/>
+              <a:t>Reservas Reprográficas do Leitor</a:t>
+            </a:r>
+          </a:p>
+        </p:txBody>
+      </p:sp>
+    </p:spTree>
+    <p:extLst>
+      <p:ext uri="{BB962C8B-B14F-4D97-AF65-F5344CB8AC3E}">
+        <p14:creationId xmlns:p14="http://schemas.microsoft.com/office/powerpoint/2010/main" val="1693518004"/>
+      </p:ext>
+    </p:extLst>
+  </p:cSld>
+  <p:clrMapOvr>
+    <a:masterClrMapping/>
+  </p:clrMapOvr>
+</p:sld>
+</file>
+
+<file path=ppt/slides/slide9.xml><?xml version="1.0" encoding="utf-8"?>
+<p:sld xmlns:a="http://schemas.openxmlformats.org/drawingml/2006/main" xmlns:r="http://schemas.openxmlformats.org/officeDocument/2006/relationships" xmlns:p="http://schemas.openxmlformats.org/presentationml/2006/main">
+  <p:cSld>
+    <p:spTree>
+      <p:nvGrpSpPr>
+        <p:cNvPr id="1" name=""/>
+        <p:cNvGrpSpPr/>
+        <p:nvPr/>
+      </p:nvGrpSpPr>
+      <p:grpSpPr>
+        <a:xfrm>
+          <a:off x="0" y="0"/>
+          <a:ext cx="0" cy="0"/>
+          <a:chOff x="0" y="0"/>
+          <a:chExt cx="0" cy="0"/>
+        </a:xfrm>
+      </p:grpSpPr>
+      <p:pic>
+        <p:nvPicPr>
+          <p:cNvPr id="4" name="Marcador de Posição de Conteúdo 3">
+            <a:extLst>
+              <a:ext uri="{FF2B5EF4-FFF2-40B4-BE49-F238E27FC236}">
+                <a16:creationId xmlns:a16="http://schemas.microsoft.com/office/drawing/2014/main" id="{48FB4D66-8EDA-451B-9773-7E20C2C6DDCF}"/>
+              </a:ext>
+            </a:extLst>
+          </p:cNvPr>
+          <p:cNvPicPr>
+            <a:picLocks noGrp="1" noChangeAspect="1"/>
+          </p:cNvPicPr>
+          <p:nvPr>
+            <p:ph idx="1"/>
+          </p:nvPr>
+        </p:nvPicPr>
+        <p:blipFill>
+          <a:blip r:embed="rId2"/>
+          <a:stretch>
+            <a:fillRect/>
+          </a:stretch>
+        </p:blipFill>
+        <p:spPr>
+          <a:xfrm>
+            <a:off x="838200" y="1828800"/>
+            <a:ext cx="2446511" cy="4351338"/>
+          </a:xfrm>
+          <a:prstGeom prst="rect">
+            <a:avLst/>
+          </a:prstGeom>
+          <a:ln w="6350">
+            <a:solidFill>
+              <a:schemeClr val="tx1"/>
+            </a:solidFill>
+          </a:ln>
+        </p:spPr>
+      </p:pic>
+      <p:sp>
+        <p:nvSpPr>
+          <p:cNvPr id="6" name="Título 1">
+            <a:extLst>
+              <a:ext uri="{FF2B5EF4-FFF2-40B4-BE49-F238E27FC236}">
+                <a16:creationId xmlns:a16="http://schemas.microsoft.com/office/drawing/2014/main" id="{6D99093A-46A8-4CA3-B439-A3B0BB14DC93}"/>
+              </a:ext>
+            </a:extLst>
+          </p:cNvPr>
+          <p:cNvSpPr txBox="1">
+            <a:spLocks/>
+          </p:cNvSpPr>
+          <p:nvPr/>
+        </p:nvSpPr>
+        <p:spPr>
+          <a:xfrm>
+            <a:off x="838200" y="0"/>
+            <a:ext cx="10515600" cy="1325563"/>
+          </a:xfrm>
+          <a:prstGeom prst="rect">
+            <a:avLst/>
+          </a:prstGeom>
+        </p:spPr>
+        <p:txBody>
+          <a:bodyPr vert="horz" lIns="91440" tIns="45720" rIns="91440" bIns="45720" rtlCol="0" anchor="ctr">
+            <a:normAutofit/>
+          </a:bodyPr>
+          <a:lstStyle>
+            <a:lvl1pPr algn="l" defTabSz="914400" rtl="0" eaLnBrk="1" latinLnBrk="0" hangingPunct="1">
+              <a:lnSpc>
+                <a:spcPct val="90000"/>
+              </a:lnSpc>
+              <a:spcBef>
+                <a:spcPct val="0"/>
+              </a:spcBef>
+              <a:buNone/>
+              <a:defRPr sz="4400" kern="1200">
+                <a:solidFill>
+                  <a:schemeClr val="tx1"/>
+                </a:solidFill>
+                <a:latin typeface="+mj-lt"/>
+                <a:ea typeface="+mj-ea"/>
+                <a:cs typeface="+mj-cs"/>
+              </a:defRPr>
+            </a:lvl1pPr>
+          </a:lstStyle>
+          <a:p>
+            <a:pPr algn="ctr"/>
+            <a:r>
+              <a:rPr lang="pt-PT" b="1" dirty="0"/>
+              <a:t>Mockups</a:t>
+            </a:r>
+          </a:p>
+        </p:txBody>
+      </p:sp>
+      <p:pic>
+        <p:nvPicPr>
+          <p:cNvPr id="7" name="Imagem 6">
+            <a:extLst>
+              <a:ext uri="{FF2B5EF4-FFF2-40B4-BE49-F238E27FC236}">
+                <a16:creationId xmlns:a16="http://schemas.microsoft.com/office/drawing/2014/main" id="{AE846B59-EA4D-4235-811D-4F442F8A9691}"/>
+              </a:ext>
+            </a:extLst>
+          </p:cNvPr>
+          <p:cNvPicPr>
+            <a:picLocks noChangeAspect="1"/>
+          </p:cNvPicPr>
+          <p:nvPr/>
+        </p:nvPicPr>
+        <p:blipFill>
+          <a:blip r:embed="rId3"/>
+          <a:stretch>
+            <a:fillRect/>
+          </a:stretch>
+        </p:blipFill>
+        <p:spPr>
+          <a:xfrm>
+            <a:off x="4872744" y="1828799"/>
+            <a:ext cx="2446512" cy="4351339"/>
+          </a:xfrm>
+          <a:prstGeom prst="rect">
+            <a:avLst/>
+          </a:prstGeom>
+          <a:ln w="6350">
+            <a:solidFill>
+              <a:schemeClr val="tx1"/>
+            </a:solidFill>
+          </a:ln>
+        </p:spPr>
+      </p:pic>
+      <p:pic>
+        <p:nvPicPr>
+          <p:cNvPr id="8" name="Imagem 7">
+            <a:extLst>
+              <a:ext uri="{FF2B5EF4-FFF2-40B4-BE49-F238E27FC236}">
+                <a16:creationId xmlns:a16="http://schemas.microsoft.com/office/drawing/2014/main" id="{2FAFEB33-5B25-4F9B-9188-80CAF9CF21D4}"/>
+              </a:ext>
+            </a:extLst>
+          </p:cNvPr>
+          <p:cNvPicPr>
+            <a:picLocks noChangeAspect="1"/>
+          </p:cNvPicPr>
+          <p:nvPr/>
+        </p:nvPicPr>
+        <p:blipFill>
+          <a:blip r:embed="rId4"/>
+          <a:stretch>
+            <a:fillRect/>
+          </a:stretch>
+        </p:blipFill>
+        <p:spPr>
+          <a:xfrm>
+            <a:off x="8907288" y="1828799"/>
+            <a:ext cx="2446512" cy="4351339"/>
+          </a:xfrm>
+          <a:prstGeom prst="rect">
+            <a:avLst/>
+          </a:prstGeom>
+          <a:ln w="6350">
+            <a:solidFill>
+              <a:schemeClr val="tx1"/>
+            </a:solidFill>
+          </a:ln>
+        </p:spPr>
+      </p:pic>
+      <p:sp>
+        <p:nvSpPr>
+          <p:cNvPr id="9" name="CaixaDeTexto 8">
+            <a:extLst>
+              <a:ext uri="{FF2B5EF4-FFF2-40B4-BE49-F238E27FC236}">
+                <a16:creationId xmlns:a16="http://schemas.microsoft.com/office/drawing/2014/main" id="{249AECFF-FAD6-4BF2-8820-7925A4D8DADC}"/>
+              </a:ext>
+            </a:extLst>
+          </p:cNvPr>
+          <p:cNvSpPr txBox="1"/>
+          <p:nvPr/>
+        </p:nvSpPr>
+        <p:spPr>
+          <a:xfrm>
+            <a:off x="838200" y="1459467"/>
+            <a:ext cx="2446510" cy="369332"/>
+          </a:xfrm>
+          <a:prstGeom prst="rect">
+            <a:avLst/>
+          </a:prstGeom>
+          <a:noFill/>
+        </p:spPr>
+        <p:txBody>
+          <a:bodyPr wrap="square" rtlCol="0">
+            <a:spAutoFit/>
+          </a:bodyPr>
+          <a:lstStyle/>
+          <a:p>
+            <a:pPr algn="ctr"/>
+            <a:r>
+              <a:rPr lang="pt-PT" dirty="0"/>
+              <a:t>Editar a Ficha do Leitor</a:t>
+            </a:r>
+          </a:p>
+        </p:txBody>
+      </p:sp>
+      <p:sp>
+        <p:nvSpPr>
+          <p:cNvPr id="11" name="CaixaDeTexto 10">
+            <a:extLst>
+              <a:ext uri="{FF2B5EF4-FFF2-40B4-BE49-F238E27FC236}">
+                <a16:creationId xmlns:a16="http://schemas.microsoft.com/office/drawing/2014/main" id="{1AE7B4DE-5A31-42CD-ACF2-E74A27A5F526}"/>
+              </a:ext>
+            </a:extLst>
+          </p:cNvPr>
+          <p:cNvSpPr txBox="1"/>
+          <p:nvPr/>
+        </p:nvSpPr>
+        <p:spPr>
+          <a:xfrm>
+            <a:off x="4872746" y="1465038"/>
+            <a:ext cx="2446510" cy="369332"/>
+          </a:xfrm>
+          <a:prstGeom prst="rect">
+            <a:avLst/>
+          </a:prstGeom>
+          <a:noFill/>
+        </p:spPr>
+        <p:txBody>
+          <a:bodyPr wrap="square" rtlCol="0">
+            <a:spAutoFit/>
+          </a:bodyPr>
+          <a:lstStyle/>
+          <a:p>
+            <a:pPr algn="ctr"/>
+            <a:r>
+              <a:rPr lang="pt-PT" dirty="0"/>
+              <a:t>Criar a Ficha do Leitor</a:t>
+            </a:r>
+          </a:p>
+        </p:txBody>
+      </p:sp>
+      <p:sp>
+        <p:nvSpPr>
+          <p:cNvPr id="13" name="CaixaDeTexto 12">
+            <a:extLst>
+              <a:ext uri="{FF2B5EF4-FFF2-40B4-BE49-F238E27FC236}">
+                <a16:creationId xmlns:a16="http://schemas.microsoft.com/office/drawing/2014/main" id="{8516815F-FA92-4F65-8CA4-7FA59A0D45C7}"/>
+              </a:ext>
+            </a:extLst>
+          </p:cNvPr>
+          <p:cNvSpPr txBox="1"/>
+          <p:nvPr/>
+        </p:nvSpPr>
+        <p:spPr>
+          <a:xfrm>
+            <a:off x="8760603" y="1459467"/>
+            <a:ext cx="2739882" cy="369332"/>
+          </a:xfrm>
+          <a:prstGeom prst="rect">
+            <a:avLst/>
+          </a:prstGeom>
+          <a:noFill/>
+        </p:spPr>
+        <p:txBody>
+          <a:bodyPr wrap="square" rtlCol="0">
+            <a:spAutoFit/>
+          </a:bodyPr>
+          <a:lstStyle/>
+          <a:p>
+            <a:pPr algn="ctr"/>
+            <a:r>
+              <a:rPr lang="pt-PT" dirty="0"/>
+              <a:t>Ficha de Obra Monográfica</a:t>
+            </a:r>
+          </a:p>
+        </p:txBody>
+      </p:sp>
+    </p:spTree>
+    <p:extLst>
+      <p:ext uri="{BB962C8B-B14F-4D97-AF65-F5344CB8AC3E}">
+        <p14:creationId xmlns:p14="http://schemas.microsoft.com/office/powerpoint/2010/main" val="75710174"/>
       </p:ext>
     </p:extLst>
   </p:cSld>

</xml_diff>